<commit_message>
Updated class diagram and finally exported it toUpdated presentation accordingly
</commit_message>
<xml_diff>
--- a/documents/milestone3/Project Design Presentation.pptx
+++ b/documents/milestone3/Project Design Presentation.pptx
@@ -117,6 +117,9 @@
     <p:ext uri="{EFAFB233-063F-42B5-8137-9DF3F51BA10A}">
       <p15:sldGuideLst xmlns:p15="http://schemas.microsoft.com/office/powerpoint/2012/main"/>
     </p:ext>
+    <p:ext uri="{2D200454-40CA-4A62-9FC3-DE9A4176ACB9}">
+      <p15:notesGuideLst xmlns:p15="http://schemas.microsoft.com/office/powerpoint/2012/main"/>
+    </p:ext>
   </p:extLst>
 </p:presentation>
 </file>
@@ -207,7 +210,7 @@
           <a:p>
             <a:fld id="{996702D7-FFC7-4541-8679-A800B838F073}" type="datetimeFigureOut">
               <a:rPr lang="en-US" smtClean="0"/>
-              <a:t>11/20/17</a:t>
+              <a:t>11/20/2017</a:t>
             </a:fld>
             <a:endParaRPr lang="en-US"/>
           </a:p>
@@ -365,7 +368,7 @@
           <a:p>
             <a:fld id="{A4838B1D-A33A-4C45-A183-851BF801C5ED}" type="slidenum">
               <a:rPr lang="en-US" smtClean="0"/>
-              <a:t>‹#›</a:t>
+              <a:t>‹Nr.›</a:t>
             </a:fld>
             <a:endParaRPr lang="en-US"/>
           </a:p>
@@ -716,7 +719,7 @@
           <a:p>
             <a:fld id="{92B3D0C1-4C55-4174-ACB6-FE14EF983A6D}" type="datetimeFigureOut">
               <a:rPr lang="de-CH" smtClean="0"/>
-              <a:t>20.11.17</a:t>
+              <a:t>20.11.2017</a:t>
             </a:fld>
             <a:endParaRPr lang="de-CH"/>
           </a:p>
@@ -778,7 +781,7 @@
           <a:p>
             <a:fld id="{216A1CAF-9D75-4D9A-A163-4634AE7ED004}" type="slidenum">
               <a:rPr lang="de-CH" smtClean="0"/>
-              <a:t>‹#›</a:t>
+              <a:t>‹Nr.›</a:t>
             </a:fld>
             <a:endParaRPr lang="de-CH"/>
           </a:p>
@@ -944,7 +947,7 @@
           <a:p>
             <a:fld id="{92B3D0C1-4C55-4174-ACB6-FE14EF983A6D}" type="datetimeFigureOut">
               <a:rPr lang="de-CH" smtClean="0"/>
-              <a:t>20.11.17</a:t>
+              <a:t>20.11.2017</a:t>
             </a:fld>
             <a:endParaRPr lang="de-CH"/>
           </a:p>
@@ -986,7 +989,7 @@
           <a:p>
             <a:fld id="{216A1CAF-9D75-4D9A-A163-4634AE7ED004}" type="slidenum">
               <a:rPr lang="de-CH" smtClean="0"/>
-              <a:t>‹#›</a:t>
+              <a:t>‹Nr.›</a:t>
             </a:fld>
             <a:endParaRPr lang="de-CH"/>
           </a:p>
@@ -1124,7 +1127,7 @@
           <a:p>
             <a:fld id="{92B3D0C1-4C55-4174-ACB6-FE14EF983A6D}" type="datetimeFigureOut">
               <a:rPr lang="de-CH" smtClean="0"/>
-              <a:t>20.11.17</a:t>
+              <a:t>20.11.2017</a:t>
             </a:fld>
             <a:endParaRPr lang="de-CH"/>
           </a:p>
@@ -1166,7 +1169,7 @@
           <a:p>
             <a:fld id="{216A1CAF-9D75-4D9A-A163-4634AE7ED004}" type="slidenum">
               <a:rPr lang="de-CH" smtClean="0"/>
-              <a:t>‹#›</a:t>
+              <a:t>‹Nr.›</a:t>
             </a:fld>
             <a:endParaRPr lang="de-CH"/>
           </a:p>
@@ -1294,7 +1297,7 @@
           <a:p>
             <a:fld id="{92B3D0C1-4C55-4174-ACB6-FE14EF983A6D}" type="datetimeFigureOut">
               <a:rPr lang="de-CH" smtClean="0"/>
-              <a:t>20.11.17</a:t>
+              <a:t>20.11.2017</a:t>
             </a:fld>
             <a:endParaRPr lang="de-CH"/>
           </a:p>
@@ -1336,7 +1339,7 @@
           <a:p>
             <a:fld id="{216A1CAF-9D75-4D9A-A163-4634AE7ED004}" type="slidenum">
               <a:rPr lang="de-CH" smtClean="0"/>
-              <a:t>‹#›</a:t>
+              <a:t>‹Nr.›</a:t>
             </a:fld>
             <a:endParaRPr lang="de-CH"/>
           </a:p>
@@ -1548,7 +1551,7 @@
           <a:p>
             <a:fld id="{92B3D0C1-4C55-4174-ACB6-FE14EF983A6D}" type="datetimeFigureOut">
               <a:rPr lang="de-CH" smtClean="0"/>
-              <a:t>20.11.17</a:t>
+              <a:t>20.11.2017</a:t>
             </a:fld>
             <a:endParaRPr lang="de-CH"/>
           </a:p>
@@ -1590,7 +1593,7 @@
           <a:p>
             <a:fld id="{216A1CAF-9D75-4D9A-A163-4634AE7ED004}" type="slidenum">
               <a:rPr lang="de-CH" smtClean="0"/>
-              <a:t>‹#›</a:t>
+              <a:t>‹Nr.›</a:t>
             </a:fld>
             <a:endParaRPr lang="de-CH"/>
           </a:p>
@@ -1874,7 +1877,7 @@
           <a:p>
             <a:fld id="{92B3D0C1-4C55-4174-ACB6-FE14EF983A6D}" type="datetimeFigureOut">
               <a:rPr lang="de-CH" smtClean="0"/>
-              <a:t>20.11.17</a:t>
+              <a:t>20.11.2017</a:t>
             </a:fld>
             <a:endParaRPr lang="de-CH"/>
           </a:p>
@@ -1916,7 +1919,7 @@
           <a:p>
             <a:fld id="{216A1CAF-9D75-4D9A-A163-4634AE7ED004}" type="slidenum">
               <a:rPr lang="de-CH" smtClean="0"/>
-              <a:t>‹#›</a:t>
+              <a:t>‹Nr.›</a:t>
             </a:fld>
             <a:endParaRPr lang="de-CH"/>
           </a:p>
@@ -2325,7 +2328,7 @@
           <a:p>
             <a:fld id="{92B3D0C1-4C55-4174-ACB6-FE14EF983A6D}" type="datetimeFigureOut">
               <a:rPr lang="de-CH" smtClean="0"/>
-              <a:t>20.11.17</a:t>
+              <a:t>20.11.2017</a:t>
             </a:fld>
             <a:endParaRPr lang="de-CH"/>
           </a:p>
@@ -2367,7 +2370,7 @@
           <a:p>
             <a:fld id="{216A1CAF-9D75-4D9A-A163-4634AE7ED004}" type="slidenum">
               <a:rPr lang="de-CH" smtClean="0"/>
-              <a:t>‹#›</a:t>
+              <a:t>‹Nr.›</a:t>
             </a:fld>
             <a:endParaRPr lang="de-CH"/>
           </a:p>
@@ -2443,7 +2446,7 @@
           <a:p>
             <a:fld id="{92B3D0C1-4C55-4174-ACB6-FE14EF983A6D}" type="datetimeFigureOut">
               <a:rPr lang="de-CH" smtClean="0"/>
-              <a:t>20.11.17</a:t>
+              <a:t>20.11.2017</a:t>
             </a:fld>
             <a:endParaRPr lang="de-CH"/>
           </a:p>
@@ -2485,7 +2488,7 @@
           <a:p>
             <a:fld id="{216A1CAF-9D75-4D9A-A163-4634AE7ED004}" type="slidenum">
               <a:rPr lang="de-CH" smtClean="0"/>
-              <a:t>‹#›</a:t>
+              <a:t>‹Nr.›</a:t>
             </a:fld>
             <a:endParaRPr lang="de-CH"/>
           </a:p>
@@ -2538,7 +2541,7 @@
           <a:p>
             <a:fld id="{92B3D0C1-4C55-4174-ACB6-FE14EF983A6D}" type="datetimeFigureOut">
               <a:rPr lang="de-CH" smtClean="0"/>
-              <a:t>20.11.17</a:t>
+              <a:t>20.11.2017</a:t>
             </a:fld>
             <a:endParaRPr lang="de-CH"/>
           </a:p>
@@ -2580,7 +2583,7 @@
           <a:p>
             <a:fld id="{216A1CAF-9D75-4D9A-A163-4634AE7ED004}" type="slidenum">
               <a:rPr lang="de-CH" smtClean="0"/>
-              <a:t>‹#›</a:t>
+              <a:t>‹Nr.›</a:t>
             </a:fld>
             <a:endParaRPr lang="de-CH"/>
           </a:p>
@@ -2825,7 +2828,7 @@
           <a:p>
             <a:fld id="{92B3D0C1-4C55-4174-ACB6-FE14EF983A6D}" type="datetimeFigureOut">
               <a:rPr lang="de-CH" smtClean="0"/>
-              <a:t>20.11.17</a:t>
+              <a:t>20.11.2017</a:t>
             </a:fld>
             <a:endParaRPr lang="de-CH"/>
           </a:p>
@@ -2867,7 +2870,7 @@
           <a:p>
             <a:fld id="{216A1CAF-9D75-4D9A-A163-4634AE7ED004}" type="slidenum">
               <a:rPr lang="de-CH" smtClean="0"/>
-              <a:t>‹#›</a:t>
+              <a:t>‹Nr.›</a:t>
             </a:fld>
             <a:endParaRPr lang="de-CH"/>
           </a:p>
@@ -3150,7 +3153,7 @@
           <a:p>
             <a:fld id="{92B3D0C1-4C55-4174-ACB6-FE14EF983A6D}" type="datetimeFigureOut">
               <a:rPr lang="de-CH" smtClean="0"/>
-              <a:t>20.11.17</a:t>
+              <a:t>20.11.2017</a:t>
             </a:fld>
             <a:endParaRPr lang="de-CH"/>
           </a:p>
@@ -3192,7 +3195,7 @@
           <a:p>
             <a:fld id="{216A1CAF-9D75-4D9A-A163-4634AE7ED004}" type="slidenum">
               <a:rPr lang="de-CH" smtClean="0"/>
-              <a:t>‹#›</a:t>
+              <a:t>‹Nr.›</a:t>
             </a:fld>
             <a:endParaRPr lang="de-CH"/>
           </a:p>
@@ -3404,7 +3407,7 @@
           <a:p>
             <a:fld id="{92B3D0C1-4C55-4174-ACB6-FE14EF983A6D}" type="datetimeFigureOut">
               <a:rPr lang="de-CH" smtClean="0"/>
-              <a:t>20.11.17</a:t>
+              <a:t>20.11.2017</a:t>
             </a:fld>
             <a:endParaRPr lang="de-CH"/>
           </a:p>
@@ -3486,7 +3489,7 @@
           <a:p>
             <a:fld id="{216A1CAF-9D75-4D9A-A163-4634AE7ED004}" type="slidenum">
               <a:rPr lang="de-CH" smtClean="0"/>
-              <a:t>‹#›</a:t>
+              <a:t>‹Nr.›</a:t>
             </a:fld>
             <a:endParaRPr lang="de-CH"/>
           </a:p>
@@ -3897,7 +3900,7 @@
           <p:cNvPr id="5" name="Grafik 4">
             <a:extLst>
               <a:ext uri="{FF2B5EF4-FFF2-40B4-BE49-F238E27FC236}">
-                <a16:creationId xmlns:a16="http://schemas.microsoft.com/office/drawing/2014/main" xmlns="" id="{3CCF4D3B-7A0F-4753-9950-8C3AFE3346D9}"/>
+                <a16:creationId xmlns:a16="http://schemas.microsoft.com/office/drawing/2014/main" id="{3CCF4D3B-7A0F-4753-9950-8C3AFE3346D9}"/>
               </a:ext>
             </a:extLst>
           </p:cNvPr>
@@ -4091,49 +4094,41 @@
           <a:lstStyle/>
           <a:p>
             <a:r>
-              <a:rPr lang="en-US" dirty="0" smtClean="0"/>
+              <a:rPr lang="en-US" dirty="0"/>
               <a:t>Just finished iteration #4</a:t>
             </a:r>
           </a:p>
           <a:p>
             <a:pPr lvl="1"/>
             <a:r>
-              <a:rPr lang="en-US" dirty="0" smtClean="0"/>
+              <a:rPr lang="en-US" dirty="0"/>
               <a:t>Finish project design, implement game loop and map class capable of loading map from file</a:t>
             </a:r>
           </a:p>
           <a:p>
             <a:r>
-              <a:rPr lang="en-US" dirty="0" smtClean="0"/>
+              <a:rPr lang="en-US" dirty="0"/>
               <a:t>Effective time expenditures for iteration #4 in expected ranges</a:t>
             </a:r>
-            <a:endParaRPr lang="en-US" dirty="0"/>
-          </a:p>
-          <a:p>
-            <a:r>
-              <a:rPr lang="en-US" dirty="0" smtClean="0"/>
+          </a:p>
+          <a:p>
+            <a:r>
+              <a:rPr lang="en-US" dirty="0"/>
               <a:t>No major changes in the risks</a:t>
             </a:r>
-            <a:endParaRPr lang="en-US" dirty="0"/>
           </a:p>
           <a:p>
             <a:r>
               <a:rPr lang="en-US" dirty="0"/>
-              <a:t>Next up in iteration </a:t>
-            </a:r>
-            <a:r>
-              <a:rPr lang="en-US" dirty="0" smtClean="0"/>
-              <a:t>#5:</a:t>
-            </a:r>
-            <a:endParaRPr lang="en-US" dirty="0"/>
+              <a:t>Next up in iteration #5:</a:t>
+            </a:r>
           </a:p>
           <a:p>
             <a:pPr lvl="1"/>
             <a:r>
-              <a:rPr lang="en-US" dirty="0" smtClean="0"/>
+              <a:rPr lang="en-US" dirty="0"/>
               <a:t>UC 1: Play Game implemented (though without some features like upgrading towers)</a:t>
             </a:r>
-            <a:endParaRPr lang="en-US" dirty="0"/>
           </a:p>
         </p:txBody>
       </p:sp>
@@ -4486,7 +4481,7 @@
           <p:cNvPr id="12" name="Rectangle 11">
             <a:extLst>
               <a:ext uri="{FF2B5EF4-FFF2-40B4-BE49-F238E27FC236}">
-                <a16:creationId xmlns:a16="http://schemas.microsoft.com/office/drawing/2014/main" xmlns="" id="{5D5E0904-721C-4D68-9EB8-1C9752E329A7}"/>
+                <a16:creationId xmlns:a16="http://schemas.microsoft.com/office/drawing/2014/main" id="{5D5E0904-721C-4D68-9EB8-1C9752E329A7}"/>
               </a:ext>
             </a:extLst>
           </p:cNvPr>
@@ -4538,7 +4533,7 @@
           <p:cNvPr id="14" name="Rectangle 13">
             <a:extLst>
               <a:ext uri="{FF2B5EF4-FFF2-40B4-BE49-F238E27FC236}">
-                <a16:creationId xmlns:a16="http://schemas.microsoft.com/office/drawing/2014/main" xmlns="" id="{121F5E60-4E89-4B16-A245-12BD9935998D}"/>
+                <a16:creationId xmlns:a16="http://schemas.microsoft.com/office/drawing/2014/main" id="{121F5E60-4E89-4B16-A245-12BD9935998D}"/>
               </a:ext>
             </a:extLst>
           </p:cNvPr>
@@ -4598,7 +4593,7 @@
           <p:cNvPr id="16" name="Rectangle 15">
             <a:extLst>
               <a:ext uri="{FF2B5EF4-FFF2-40B4-BE49-F238E27FC236}">
-                <a16:creationId xmlns:a16="http://schemas.microsoft.com/office/drawing/2014/main" xmlns="" id="{B298ECBA-3258-45DF-8FD4-7581736BCCBC}"/>
+                <a16:creationId xmlns:a16="http://schemas.microsoft.com/office/drawing/2014/main" id="{B298ECBA-3258-45DF-8FD4-7581736BCCBC}"/>
               </a:ext>
             </a:extLst>
           </p:cNvPr>
@@ -4658,7 +4653,7 @@
           <p:cNvPr id="18" name="Rectangle 17">
             <a:extLst>
               <a:ext uri="{FF2B5EF4-FFF2-40B4-BE49-F238E27FC236}">
-                <a16:creationId xmlns:a16="http://schemas.microsoft.com/office/drawing/2014/main" xmlns="" id="{B62BF453-BD82-4B90-9FE7-51703133806E}"/>
+                <a16:creationId xmlns:a16="http://schemas.microsoft.com/office/drawing/2014/main" id="{B62BF453-BD82-4B90-9FE7-51703133806E}"/>
               </a:ext>
             </a:extLst>
           </p:cNvPr>
@@ -4710,7 +4705,7 @@
           <p:cNvPr id="20" name="Rectangle 19">
             <a:extLst>
               <a:ext uri="{FF2B5EF4-FFF2-40B4-BE49-F238E27FC236}">
-                <a16:creationId xmlns:a16="http://schemas.microsoft.com/office/drawing/2014/main" xmlns="" id="{072366D3-9B5C-42E1-9906-77FF6BB55EAB}"/>
+                <a16:creationId xmlns:a16="http://schemas.microsoft.com/office/drawing/2014/main" id="{072366D3-9B5C-42E1-9906-77FF6BB55EAB}"/>
               </a:ext>
             </a:extLst>
           </p:cNvPr>
@@ -4873,7 +4868,7 @@
           <p:cNvPr id="12" name="Rectangle 11">
             <a:extLst>
               <a:ext uri="{FF2B5EF4-FFF2-40B4-BE49-F238E27FC236}">
-                <a16:creationId xmlns:a16="http://schemas.microsoft.com/office/drawing/2014/main" xmlns="" id="{5D5E0904-721C-4D68-9EB8-1C9752E329A7}"/>
+                <a16:creationId xmlns:a16="http://schemas.microsoft.com/office/drawing/2014/main" id="{5D5E0904-721C-4D68-9EB8-1C9752E329A7}"/>
               </a:ext>
             </a:extLst>
           </p:cNvPr>
@@ -4925,7 +4920,7 @@
           <p:cNvPr id="14" name="Rectangle 13">
             <a:extLst>
               <a:ext uri="{FF2B5EF4-FFF2-40B4-BE49-F238E27FC236}">
-                <a16:creationId xmlns:a16="http://schemas.microsoft.com/office/drawing/2014/main" xmlns="" id="{121F5E60-4E89-4B16-A245-12BD9935998D}"/>
+                <a16:creationId xmlns:a16="http://schemas.microsoft.com/office/drawing/2014/main" id="{121F5E60-4E89-4B16-A245-12BD9935998D}"/>
               </a:ext>
             </a:extLst>
           </p:cNvPr>
@@ -4985,7 +4980,7 @@
           <p:cNvPr id="16" name="Rectangle 15">
             <a:extLst>
               <a:ext uri="{FF2B5EF4-FFF2-40B4-BE49-F238E27FC236}">
-                <a16:creationId xmlns:a16="http://schemas.microsoft.com/office/drawing/2014/main" xmlns="" id="{B298ECBA-3258-45DF-8FD4-7581736BCCBC}"/>
+                <a16:creationId xmlns:a16="http://schemas.microsoft.com/office/drawing/2014/main" id="{B298ECBA-3258-45DF-8FD4-7581736BCCBC}"/>
               </a:ext>
             </a:extLst>
           </p:cNvPr>
@@ -5045,7 +5040,7 @@
           <p:cNvPr id="18" name="Rectangle 17">
             <a:extLst>
               <a:ext uri="{FF2B5EF4-FFF2-40B4-BE49-F238E27FC236}">
-                <a16:creationId xmlns:a16="http://schemas.microsoft.com/office/drawing/2014/main" xmlns="" id="{B62BF453-BD82-4B90-9FE7-51703133806E}"/>
+                <a16:creationId xmlns:a16="http://schemas.microsoft.com/office/drawing/2014/main" id="{B62BF453-BD82-4B90-9FE7-51703133806E}"/>
               </a:ext>
             </a:extLst>
           </p:cNvPr>
@@ -5097,7 +5092,7 @@
           <p:cNvPr id="20" name="Rectangle 19">
             <a:extLst>
               <a:ext uri="{FF2B5EF4-FFF2-40B4-BE49-F238E27FC236}">
-                <a16:creationId xmlns:a16="http://schemas.microsoft.com/office/drawing/2014/main" xmlns="" id="{072366D3-9B5C-42E1-9906-77FF6BB55EAB}"/>
+                <a16:creationId xmlns:a16="http://schemas.microsoft.com/office/drawing/2014/main" id="{072366D3-9B5C-42E1-9906-77FF6BB55EAB}"/>
               </a:ext>
             </a:extLst>
           </p:cNvPr>
@@ -5149,10 +5144,56 @@
           </a:p>
         </p:txBody>
       </p:sp>
+      <p:sp>
+        <p:nvSpPr>
+          <p:cNvPr id="2" name="Title 1"/>
+          <p:cNvSpPr>
+            <a:spLocks noGrp="1"/>
+          </p:cNvSpPr>
+          <p:nvPr>
+            <p:ph type="title"/>
+          </p:nvPr>
+        </p:nvSpPr>
+        <p:spPr>
+          <a:xfrm>
+            <a:off x="8940226" y="1404932"/>
+            <a:ext cx="2802194" cy="4041648"/>
+          </a:xfrm>
+        </p:spPr>
+        <p:txBody>
+          <a:bodyPr vert="horz" lIns="91440" tIns="45720" rIns="91440" bIns="45720" rtlCol="0" anchor="b">
+            <a:normAutofit/>
+          </a:bodyPr>
+          <a:lstStyle/>
+          <a:p>
+            <a:pPr>
+              <a:lnSpc>
+                <a:spcPct val="85000"/>
+              </a:lnSpc>
+            </a:pPr>
+            <a:r>
+              <a:rPr lang="en-US" dirty="0">
+                <a:solidFill>
+                  <a:srgbClr val="FFFFFF"/>
+                </a:solidFill>
+              </a:rPr>
+              <a:t>Design Class Diagram</a:t>
+            </a:r>
+          </a:p>
+        </p:txBody>
+      </p:sp>
       <p:pic>
         <p:nvPicPr>
-          <p:cNvPr id="7" name="Grafik 8"/>
-          <p:cNvPicPr/>
+          <p:cNvPr id="6" name="Grafik 5">
+            <a:extLst>
+              <a:ext uri="{FF2B5EF4-FFF2-40B4-BE49-F238E27FC236}">
+                <a16:creationId xmlns:a16="http://schemas.microsoft.com/office/drawing/2014/main" id="{4DFAB5F5-3E8B-417F-A289-152964A0A1C4}"/>
+              </a:ext>
+            </a:extLst>
+          </p:cNvPr>
+          <p:cNvPicPr>
+            <a:picLocks noChangeAspect="1"/>
+          </p:cNvPicPr>
           <p:nvPr/>
         </p:nvPicPr>
         <p:blipFill>
@@ -5163,60 +5204,20 @@
               </a:ext>
             </a:extLst>
           </a:blip>
-          <a:srcRect/>
           <a:stretch>
             <a:fillRect/>
           </a:stretch>
         </p:blipFill>
-        <p:spPr bwMode="auto">
+        <p:spPr>
           <a:xfrm>
-            <a:off x="462117" y="758952"/>
-            <a:ext cx="7449983" cy="5177738"/>
+            <a:off x="457200" y="0"/>
+            <a:ext cx="8198662" cy="6858000"/>
           </a:xfrm>
           <a:prstGeom prst="rect">
             <a:avLst/>
           </a:prstGeom>
-          <a:noFill/>
         </p:spPr>
       </p:pic>
-      <p:sp>
-        <p:nvSpPr>
-          <p:cNvPr id="2" name="Title 1"/>
-          <p:cNvSpPr>
-            <a:spLocks noGrp="1"/>
-          </p:cNvSpPr>
-          <p:nvPr>
-            <p:ph type="title"/>
-          </p:nvPr>
-        </p:nvSpPr>
-        <p:spPr>
-          <a:xfrm>
-            <a:off x="8318090" y="758952"/>
-            <a:ext cx="2802194" cy="4041648"/>
-          </a:xfrm>
-        </p:spPr>
-        <p:txBody>
-          <a:bodyPr vert="horz" lIns="91440" tIns="45720" rIns="91440" bIns="45720" rtlCol="0" anchor="b">
-            <a:normAutofit/>
-          </a:bodyPr>
-          <a:lstStyle/>
-          <a:p>
-            <a:pPr>
-              <a:lnSpc>
-                <a:spcPct val="85000"/>
-              </a:lnSpc>
-            </a:pPr>
-            <a:r>
-              <a:rPr lang="en-US" dirty="0">
-                <a:solidFill>
-                  <a:srgbClr val="FFFFFF"/>
-                </a:solidFill>
-              </a:rPr>
-              <a:t>Design Class Diagram</a:t>
-            </a:r>
-          </a:p>
-        </p:txBody>
-      </p:sp>
     </p:spTree>
     <p:extLst>
       <p:ext uri="{BB962C8B-B14F-4D97-AF65-F5344CB8AC3E}">
@@ -5227,13 +5228,6 @@
   <p:clrMapOvr>
     <a:overrideClrMapping bg1="lt1" tx1="dk1" bg2="lt2" tx2="dk2" accent1="accent1" accent2="accent2" accent3="accent3" accent4="accent4" accent5="accent5" accent6="accent6" hlink="hlink" folHlink="folHlink"/>
   </p:clrMapOvr>
-  <p:timing>
-    <p:tnLst>
-      <p:par>
-        <p:cTn id="1" dur="indefinite" restart="never" nodeType="tmRoot"/>
-      </p:par>
-    </p:tnLst>
-  </p:timing>
 </p:sld>
 </file>
 
@@ -5269,7 +5263,7 @@
           <p:cNvPr id="23" name="Rectangle 22">
             <a:extLst>
               <a:ext uri="{FF2B5EF4-FFF2-40B4-BE49-F238E27FC236}">
-                <a16:creationId xmlns:a16="http://schemas.microsoft.com/office/drawing/2014/main" xmlns="" id="{5D5E0904-721C-4D68-9EB8-1C9752E329A7}"/>
+                <a16:creationId xmlns:a16="http://schemas.microsoft.com/office/drawing/2014/main" id="{5D5E0904-721C-4D68-9EB8-1C9752E329A7}"/>
               </a:ext>
             </a:extLst>
           </p:cNvPr>
@@ -5388,13 +5382,6 @@
   <p:clrMapOvr>
     <a:masterClrMapping/>
   </p:clrMapOvr>
-  <p:timing>
-    <p:tnLst>
-      <p:par>
-        <p:cTn id="1" dur="indefinite" restart="never" nodeType="tmRoot"/>
-      </p:par>
-    </p:tnLst>
-  </p:timing>
 </p:sld>
 </file>
 
@@ -5420,7 +5407,7 @@
           <p:cNvPr id="8" name="Grafik 7">
             <a:extLst>
               <a:ext uri="{FF2B5EF4-FFF2-40B4-BE49-F238E27FC236}">
-                <a16:creationId xmlns:a16="http://schemas.microsoft.com/office/drawing/2014/main" xmlns="" id="{FEADF4F9-87B1-447B-A6E7-8A6D9620218C}"/>
+                <a16:creationId xmlns:a16="http://schemas.microsoft.com/office/drawing/2014/main" id="{FEADF4F9-87B1-447B-A6E7-8A6D9620218C}"/>
               </a:ext>
             </a:extLst>
           </p:cNvPr>
@@ -5492,13 +5479,6 @@
   <p:clrMapOvr>
     <a:masterClrMapping/>
   </p:clrMapOvr>
-  <p:timing>
-    <p:tnLst>
-      <p:par>
-        <p:cTn id="1" dur="indefinite" restart="never" nodeType="tmRoot"/>
-      </p:par>
-    </p:tnLst>
-  </p:timing>
 </p:sld>
 </file>
 
@@ -5524,7 +5504,7 @@
           <p:cNvPr id="8" name="Grafik 7">
             <a:extLst>
               <a:ext uri="{FF2B5EF4-FFF2-40B4-BE49-F238E27FC236}">
-                <a16:creationId xmlns:a16="http://schemas.microsoft.com/office/drawing/2014/main" xmlns="" id="{FEADF4F9-87B1-447B-A6E7-8A6D9620218C}"/>
+                <a16:creationId xmlns:a16="http://schemas.microsoft.com/office/drawing/2014/main" id="{FEADF4F9-87B1-447B-A6E7-8A6D9620218C}"/>
               </a:ext>
             </a:extLst>
           </p:cNvPr>

</xml_diff>